<commit_message>
Updated metadata for docs Updated ppt doc Updated checklist to 1.3 with new CG-Trim table Added src documents for SOP docs.
</commit_message>
<xml_diff>
--- a/src/sop/CG-Trim-Table.pptx
+++ b/src/sop/CG-Trim-Table.pptx
@@ -1,6 +1,6 @@
 
 <file path=ppt/presentation.xml><?xml version="1.0" encoding="utf-8"?>
-<p:presentation xmlns:a="http://schemas.openxmlformats.org/drawingml/2006/main" xmlns:r="http://schemas.openxmlformats.org/officeDocument/2006/relationships" xmlns:p="http://schemas.openxmlformats.org/presentationml/2006/main" saveSubsetFonts="1">
+<p:presentation xmlns:a="http://schemas.openxmlformats.org/drawingml/2006/main" xmlns:r="http://schemas.openxmlformats.org/officeDocument/2006/relationships" xmlns:p="http://schemas.openxmlformats.org/presentationml/2006/main" removePersonalInfoOnSave="1" saveSubsetFonts="1">
   <p:sldMasterIdLst>
     <p:sldMasterId id="2147483648" r:id="rId1"/>
   </p:sldMasterIdLst>
@@ -104,6 +104,11 @@
       </a:defRPr>
     </a:lvl9pPr>
   </p:defaultTextStyle>
+  <p:extLst>
+    <p:ext uri="{EFAFB233-063F-42B5-8137-9DF3F51BA10A}">
+      <p15:sldGuideLst xmlns:p15="http://schemas.microsoft.com/office/powerpoint/2012/main"/>
+    </p:ext>
+  </p:extLst>
 </p:presentation>
 </file>
 
@@ -3344,7 +3349,7 @@
               </a:ext>
             </a:extLst>
           </a:blip>
-          <a:srcRect l="2041" t="25962" r="2789" b="56895"/>
+          <a:srcRect/>
           <a:stretch/>
         </p:blipFill>
         <p:spPr bwMode="auto">

</xml_diff>

<commit_message>
Updated Checklist with neo trim scale
</commit_message>
<xml_diff>
--- a/src/sop/CG-Trim-Table.pptx
+++ b/src/sop/CG-Trim-Table.pptx
@@ -3328,10 +3328,10 @@
       </p:grpSpPr>
       <p:pic>
         <p:nvPicPr>
-          <p:cNvPr id="1026" name="Picture 2">
-            <a:extLst>
-              <a:ext uri="{FF2B5EF4-FFF2-40B4-BE49-F238E27FC236}">
-                <a16:creationId xmlns:a16="http://schemas.microsoft.com/office/drawing/2014/main" id="{6729748E-8840-4F3F-9F21-BE1ADC0C9152}"/>
+          <p:cNvPr id="1028" name="Picture 4">
+            <a:extLst>
+              <a:ext uri="{FF2B5EF4-FFF2-40B4-BE49-F238E27FC236}">
+                <a16:creationId xmlns:a16="http://schemas.microsoft.com/office/drawing/2014/main" id="{85D69293-38FE-48C6-9351-A390D5C1BECC}"/>
               </a:ext>
             </a:extLst>
           </p:cNvPr>
@@ -3340,9 +3340,9 @@
           </p:cNvPicPr>
           <p:nvPr/>
         </p:nvPicPr>
-        <p:blipFill rotWithShape="1">
+        <p:blipFill>
           <a:blip r:embed="rId2">
-            <a:alphaModFix amt="10000"/>
+            <a:alphaModFix amt="20000"/>
             <a:extLst>
               <a:ext uri="{28A0092B-C50C-407E-A947-70E740481C1C}">
                 <a14:useLocalDpi xmlns:a14="http://schemas.microsoft.com/office/drawing/2010/main" val="0"/>
@@ -3350,12 +3350,14 @@
             </a:extLst>
           </a:blip>
           <a:srcRect/>
-          <a:stretch/>
+          <a:stretch>
+            <a:fillRect/>
+          </a:stretch>
         </p:blipFill>
         <p:spPr bwMode="auto">
           <a:xfrm>
-            <a:off x="2436568" y="1317520"/>
-            <a:ext cx="7568458" cy="746567"/>
+            <a:off x="383770" y="71680"/>
+            <a:ext cx="11190913" cy="1801662"/>
           </a:xfrm>
           <a:prstGeom prst="rect">
             <a:avLst/>
@@ -3592,7 +3594,7 @@
         </p:nvCxnSpPr>
         <p:spPr>
           <a:xfrm flipV="1">
-            <a:off x="6570922" y="2677785"/>
+            <a:off x="7136072" y="2677785"/>
             <a:ext cx="0" cy="142017"/>
           </a:xfrm>
           <a:prstGeom prst="line">
@@ -3631,7 +3633,7 @@
         </p:nvCxnSpPr>
         <p:spPr>
           <a:xfrm flipV="1">
-            <a:off x="7627643" y="2677785"/>
+            <a:off x="7999118" y="2678973"/>
             <a:ext cx="0" cy="142017"/>
           </a:xfrm>
           <a:prstGeom prst="line">
@@ -3670,7 +3672,7 @@
         </p:nvCxnSpPr>
         <p:spPr>
           <a:xfrm flipV="1">
-            <a:off x="8693888" y="2677785"/>
+            <a:off x="8871688" y="2677785"/>
             <a:ext cx="0" cy="142017"/>
           </a:xfrm>
           <a:prstGeom prst="line">
@@ -3709,7 +3711,7 @@
         </p:nvCxnSpPr>
         <p:spPr>
           <a:xfrm flipV="1">
-            <a:off x="5471005" y="2677785"/>
+            <a:off x="5407505" y="2677785"/>
             <a:ext cx="0" cy="142017"/>
           </a:xfrm>
           <a:prstGeom prst="line">
@@ -3748,7 +3750,7 @@
         </p:nvCxnSpPr>
         <p:spPr>
           <a:xfrm flipV="1">
-            <a:off x="4432004" y="2677785"/>
+            <a:off x="4555829" y="2674610"/>
             <a:ext cx="0" cy="142017"/>
           </a:xfrm>
           <a:prstGeom prst="line">
@@ -3982,7 +3984,7 @@
         </p:nvCxnSpPr>
         <p:spPr>
           <a:xfrm flipV="1">
-            <a:off x="5976052" y="2537879"/>
+            <a:off x="5979227" y="2537879"/>
             <a:ext cx="0" cy="142017"/>
           </a:xfrm>
           <a:prstGeom prst="line">
@@ -4138,7 +4140,7 @@
         </p:nvCxnSpPr>
         <p:spPr>
           <a:xfrm flipV="1">
-            <a:off x="7859177" y="2537879"/>
+            <a:off x="7868702" y="2537879"/>
             <a:ext cx="0" cy="142017"/>
           </a:xfrm>
           <a:prstGeom prst="line">
@@ -4177,7 +4179,7 @@
         </p:nvCxnSpPr>
         <p:spPr>
           <a:xfrm flipV="1">
-            <a:off x="8331661" y="2537879"/>
+            <a:off x="8338011" y="2537879"/>
             <a:ext cx="0" cy="142017"/>
           </a:xfrm>
           <a:prstGeom prst="line">
@@ -4216,7 +4218,7 @@
         </p:nvCxnSpPr>
         <p:spPr>
           <a:xfrm flipV="1">
-            <a:off x="4084453" y="2537879"/>
+            <a:off x="4100328" y="2537879"/>
             <a:ext cx="0" cy="142017"/>
           </a:xfrm>
           <a:prstGeom prst="line">
@@ -4294,7 +4296,7 @@
         </p:nvCxnSpPr>
         <p:spPr>
           <a:xfrm flipV="1">
-            <a:off x="5032190" y="2537879"/>
+            <a:off x="5035365" y="2537879"/>
             <a:ext cx="0" cy="142017"/>
           </a:xfrm>
           <a:prstGeom prst="line">
@@ -4564,8 +4566,8 @@
         </p:nvSpPr>
         <p:spPr>
           <a:xfrm>
-            <a:off x="3669069" y="2769472"/>
-            <a:ext cx="5915402" cy="261610"/>
+            <a:off x="3646844" y="2769472"/>
+            <a:ext cx="5936240" cy="261610"/>
           </a:xfrm>
           <a:prstGeom prst="rect">
             <a:avLst/>
@@ -4582,7 +4584,7 @@
               <a:rPr lang="de-DE" sz="1100" dirty="0">
                 <a:latin typeface="Aileron" panose="00000500000000000000" pitchFamily="50" charset="0"/>
               </a:rPr>
-              <a:t>2.5              2                                1                                  0                                1                                 2               2.5 </a:t>
+              <a:t>3.8                   3                          2                          1                          0                          1                          2          2.5 </a:t>
             </a:r>
           </a:p>
         </p:txBody>
@@ -4744,6 +4746,92 @@
           </a:fillRef>
           <a:effectRef idx="0">
             <a:schemeClr val="accent1"/>
+          </a:effectRef>
+          <a:fontRef idx="minor">
+            <a:schemeClr val="tx1"/>
+          </a:fontRef>
+        </p:style>
+      </p:cxnSp>
+      <p:pic>
+        <p:nvPicPr>
+          <p:cNvPr id="2" name="Picture 2">
+            <a:extLst>
+              <a:ext uri="{FF2B5EF4-FFF2-40B4-BE49-F238E27FC236}">
+                <a16:creationId xmlns:a16="http://schemas.microsoft.com/office/drawing/2014/main" id="{8CBFBD0F-1994-4B61-965C-E9CBFDA18D4C}"/>
+              </a:ext>
+            </a:extLst>
+          </p:cNvPr>
+          <p:cNvPicPr>
+            <a:picLocks noChangeAspect="1" noChangeArrowheads="1"/>
+          </p:cNvPicPr>
+          <p:nvPr/>
+        </p:nvPicPr>
+        <p:blipFill>
+          <a:blip r:embed="rId3">
+            <a:extLst>
+              <a:ext uri="{28A0092B-C50C-407E-A947-70E740481C1C}">
+                <a14:useLocalDpi xmlns:a14="http://schemas.microsoft.com/office/drawing/2010/main" val="0"/>
+              </a:ext>
+            </a:extLst>
+          </a:blip>
+          <a:srcRect/>
+          <a:stretch>
+            <a:fillRect/>
+          </a:stretch>
+        </p:blipFill>
+        <p:spPr bwMode="auto">
+          <a:xfrm>
+            <a:off x="-901721" y="4491697"/>
+            <a:ext cx="1480410" cy="3041009"/>
+          </a:xfrm>
+          <a:prstGeom prst="rect">
+            <a:avLst/>
+          </a:prstGeom>
+          <a:noFill/>
+          <a:extLst>
+            <a:ext uri="{909E8E84-426E-40DD-AFC4-6F175D3DCCD1}">
+              <a14:hiddenFill xmlns:a14="http://schemas.microsoft.com/office/drawing/2010/main">
+                <a:solidFill>
+                  <a:srgbClr val="FFFFFF"/>
+                </a:solidFill>
+              </a14:hiddenFill>
+            </a:ext>
+          </a:extLst>
+        </p:spPr>
+      </p:pic>
+      <p:cxnSp>
+        <p:nvCxnSpPr>
+          <p:cNvPr id="41" name="Gerader Verbinder 40">
+            <a:extLst>
+              <a:ext uri="{FF2B5EF4-FFF2-40B4-BE49-F238E27FC236}">
+                <a16:creationId xmlns:a16="http://schemas.microsoft.com/office/drawing/2014/main" id="{B95BD5CA-B86C-4B04-B078-5318EA0F08CC}"/>
+              </a:ext>
+            </a:extLst>
+          </p:cNvPr>
+          <p:cNvCxnSpPr>
+            <a:cxnSpLocks/>
+          </p:cNvCxnSpPr>
+          <p:nvPr/>
+        </p:nvCxnSpPr>
+        <p:spPr>
+          <a:xfrm flipV="1">
+            <a:off x="6274280" y="2677028"/>
+            <a:ext cx="0" cy="142017"/>
+          </a:xfrm>
+          <a:prstGeom prst="line">
+            <a:avLst/>
+          </a:prstGeom>
+          <a:ln w="12700"/>
+        </p:spPr>
+        <p:style>
+          <a:lnRef idx="1">
+            <a:schemeClr val="dk1"/>
+          </a:lnRef>
+          <a:fillRef idx="0">
+            <a:schemeClr val="dk1"/>
+          </a:fillRef>
+          <a:effectRef idx="0">
+            <a:schemeClr val="dk1"/>
           </a:effectRef>
           <a:fontRef idx="minor">
             <a:schemeClr val="tx1"/>

</xml_diff>